<commit_message>
Update What's New in SQL 2019.pptx
</commit_message>
<xml_diff>
--- a/Data Architecture Virtual User Group/What's New in SQL 2019.pptx
+++ b/Data Architecture Virtual User Group/What's New in SQL 2019.pptx
@@ -18953,7 +18953,7 @@
         <p:spPr>
           <a:xfrm>
             <a:off x="211569" y="1382945"/>
-            <a:ext cx="11128648" cy="4031873"/>
+            <a:ext cx="11128648" cy="3970318"/>
           </a:xfrm>
           <a:prstGeom prst="rect">
             <a:avLst/>
@@ -18970,34 +18970,8 @@
               <a:buChar char="•"/>
             </a:pPr>
             <a:r>
-              <a:rPr lang="en-US" sz="3200" dirty="0"/>
-              <a:t>Writeable as of SQL 2016. Prior, </a:t>
-            </a:r>
-            <a:r>
-              <a:rPr lang="en-US" sz="3200" dirty="0" err="1"/>
-              <a:t>columnstore</a:t>
-            </a:r>
-            <a:r>
-              <a:rPr lang="en-US" sz="3200" dirty="0"/>
-              <a:t> indexes read-only.</a:t>
-            </a:r>
-          </a:p>
-          <a:p>
-            <a:pPr marL="914400" lvl="1" indent="-457200">
-              <a:buFont typeface="Arial" panose="020B0604020202020204" pitchFamily="34" charset="0"/>
-              <a:buChar char="•"/>
-            </a:pPr>
-            <a:r>
-              <a:rPr lang="en-US" sz="2800" dirty="0"/>
-              <a:t>This finally unleashed </a:t>
-            </a:r>
-            <a:r>
-              <a:rPr lang="en-US" sz="2800" dirty="0" err="1"/>
-              <a:t>columnstore</a:t>
-            </a:r>
-            <a:r>
-              <a:rPr lang="en-US" sz="2800" dirty="0"/>
-              <a:t> indexes for use in OLTP.</a:t>
+              <a:rPr lang="en-US" sz="3600" dirty="0"/>
+              <a:t>Starting with SQL 2016, add a Columnstore index to in-memory tables for “real-time analytics” on rapidly-inserted data.</a:t>
             </a:r>
           </a:p>
           <a:p>
@@ -19006,8 +18980,16 @@
               <a:buChar char="•"/>
             </a:pPr>
             <a:r>
-              <a:rPr lang="en-US" sz="3200" dirty="0"/>
-              <a:t>Starting with SQL 2016, add a Columnstore index to in-memory tables for “real-time analytics” on rapidly-inserted data</a:t>
+              <a:rPr lang="en-US" sz="3600" dirty="0"/>
+              <a:t>With SQL Server 2016 SP1, Columnstore indexes are available </a:t>
+            </a:r>
+            <a:r>
+              <a:rPr lang="en-US" sz="3600" b="1" dirty="0"/>
+              <a:t>below Enterprise edition </a:t>
+            </a:r>
+            <a:r>
+              <a:rPr lang="en-US" sz="3600" dirty="0"/>
+              <a:t>(with memory limits)</a:t>
             </a:r>
           </a:p>
           <a:p>
@@ -19016,25 +18998,7 @@
               <a:buChar char="•"/>
             </a:pPr>
             <a:r>
-              <a:rPr lang="en-US" sz="3200" dirty="0"/>
-              <a:t>With SQL Server 2016 SP1, Columnstore indexes are available </a:t>
-            </a:r>
-            <a:r>
-              <a:rPr lang="en-US" sz="3200" b="1" dirty="0"/>
-              <a:t>below Enterprise edition </a:t>
-            </a:r>
-            <a:r>
-              <a:rPr lang="en-US" sz="3200" dirty="0"/>
-              <a:t>(with memory limits)</a:t>
-            </a:r>
-          </a:p>
-          <a:p>
-            <a:pPr marL="457200" indent="-457200">
-              <a:buFont typeface="Arial" panose="020B0604020202020204" pitchFamily="34" charset="0"/>
-              <a:buChar char="•"/>
-            </a:pPr>
-            <a:r>
-              <a:rPr lang="en-US" sz="3200" dirty="0"/>
+              <a:rPr lang="en-US" sz="3600" dirty="0"/>
               <a:t>Starting with SQL 2016, you can now filter the Columnstore index just like a nonclustered index.</a:t>
             </a:r>
           </a:p>
@@ -25000,7 +24964,7 @@
 </file>
 
 <file path=ppt/slides/slide54.xml><?xml version="1.0" encoding="utf-8"?>
-<p:sld xmlns:a="http://schemas.openxmlformats.org/drawingml/2006/main" xmlns:r="http://schemas.openxmlformats.org/officeDocument/2006/relationships" xmlns:p="http://schemas.openxmlformats.org/presentationml/2006/main" show="0">
+<p:sld xmlns:a="http://schemas.openxmlformats.org/drawingml/2006/main" xmlns:r="http://schemas.openxmlformats.org/officeDocument/2006/relationships" xmlns:p="http://schemas.openxmlformats.org/presentationml/2006/main">
   <p:cSld>
     <p:spTree>
       <p:nvGrpSpPr>
@@ -25714,11 +25678,11 @@
   <p:clrMapOvr>
     <a:masterClrMapping/>
   </p:clrMapOvr>
-  <mc:AlternateContent xmlns:mc="http://schemas.openxmlformats.org/markup-compatibility/2006" xmlns:p14="http://schemas.microsoft.com/office/powerpoint/2010/main">
-    <mc:Choice Requires="p14">
+  <mc:AlternateContent xmlns:mc="http://schemas.openxmlformats.org/markup-compatibility/2006">
+    <mc:Choice xmlns:p14="http://schemas.microsoft.com/office/powerpoint/2010/main" Requires="p14">
       <p:transition spd="slow" p14:dur="2000" advTm="10000"/>
     </mc:Choice>
-    <mc:Fallback xmlns="">
+    <mc:Fallback>
       <p:transition spd="slow" advTm="10000"/>
     </mc:Fallback>
   </mc:AlternateContent>
@@ -25726,7 +25690,7 @@
 </file>
 
 <file path=ppt/slides/slide55.xml><?xml version="1.0" encoding="utf-8"?>
-<p:sld xmlns:a="http://schemas.openxmlformats.org/drawingml/2006/main" xmlns:r="http://schemas.openxmlformats.org/officeDocument/2006/relationships" xmlns:p="http://schemas.openxmlformats.org/presentationml/2006/main" show="0">
+<p:sld xmlns:a="http://schemas.openxmlformats.org/drawingml/2006/main" xmlns:r="http://schemas.openxmlformats.org/officeDocument/2006/relationships" xmlns:p="http://schemas.openxmlformats.org/presentationml/2006/main">
   <p:cSld>
     <p:spTree>
       <p:nvGrpSpPr>
@@ -27071,11 +27035,11 @@
   <p:clrMapOvr>
     <a:masterClrMapping/>
   </p:clrMapOvr>
-  <mc:AlternateContent xmlns:mc="http://schemas.openxmlformats.org/markup-compatibility/2006" xmlns:p14="http://schemas.microsoft.com/office/powerpoint/2010/main">
-    <mc:Choice Requires="p14">
+  <mc:AlternateContent xmlns:mc="http://schemas.openxmlformats.org/markup-compatibility/2006">
+    <mc:Choice xmlns:p14="http://schemas.microsoft.com/office/powerpoint/2010/main" Requires="p14">
       <p:transition spd="slow" p14:dur="2000" advTm="10000"/>
     </mc:Choice>
-    <mc:Fallback xmlns="">
+    <mc:Fallback>
       <p:transition spd="slow" advTm="10000"/>
     </mc:Fallback>
   </mc:AlternateContent>
@@ -27083,7 +27047,7 @@
 </file>
 
 <file path=ppt/slides/slide56.xml><?xml version="1.0" encoding="utf-8"?>
-<p:sld xmlns:a="http://schemas.openxmlformats.org/drawingml/2006/main" xmlns:r="http://schemas.openxmlformats.org/officeDocument/2006/relationships" xmlns:p="http://schemas.openxmlformats.org/presentationml/2006/main" show="0">
+<p:sld xmlns:a="http://schemas.openxmlformats.org/drawingml/2006/main" xmlns:r="http://schemas.openxmlformats.org/officeDocument/2006/relationships" xmlns:p="http://schemas.openxmlformats.org/presentationml/2006/main">
   <p:cSld>
     <p:spTree>
       <p:nvGrpSpPr>
@@ -27358,11 +27322,11 @@
   <p:clrMapOvr>
     <a:masterClrMapping/>
   </p:clrMapOvr>
-  <mc:AlternateContent xmlns:mc="http://schemas.openxmlformats.org/markup-compatibility/2006" xmlns:p14="http://schemas.microsoft.com/office/powerpoint/2010/main">
-    <mc:Choice Requires="p14">
+  <mc:AlternateContent xmlns:mc="http://schemas.openxmlformats.org/markup-compatibility/2006">
+    <mc:Choice xmlns:p14="http://schemas.microsoft.com/office/powerpoint/2010/main" Requires="p14">
       <p:transition spd="slow" p14:dur="2000" advTm="10000"/>
     </mc:Choice>
-    <mc:Fallback xmlns="">
+    <mc:Fallback>
       <p:transition spd="slow" advTm="10000"/>
     </mc:Fallback>
   </mc:AlternateContent>
@@ -27780,7 +27744,7 @@
                 <a:latin typeface="Roboto" panose="02000000000000000000" pitchFamily="2" charset="0"/>
                 <a:ea typeface="Roboto" panose="02000000000000000000" pitchFamily="2" charset="0"/>
               </a:rPr>
-              <a:t>2019 coming Q1’2019(?)</a:t>
+              <a:t>2019 coming Q1’2020(?)</a:t>
             </a:r>
           </a:p>
           <a:p>

</xml_diff>